<commit_message>
Add ORCID iD to presentations
</commit_message>
<xml_diff>
--- a/static/wp-content/uploads/2016/12/SAFIRE-CHPC-Conf-Dec-2016.pptx
+++ b/static/wp-content/uploads/2016/12/SAFIRE-CHPC-Conf-Dec-2016.pptx
@@ -33,32 +33,32 @@
   <p:notesSz cx="6858000" cy="9144000"/>
   <p:embeddedFontLst>
     <p:embeddedFont>
-      <p:font typeface="Wingdings 2" panose="05020102010507070707" pitchFamily="18" charset="2"/>
+      <p:font typeface="Esphimere Light" panose="020B0403030000020004" pitchFamily="34" charset="0"/>
       <p:regular r:id="rId21"/>
     </p:embeddedFont>
     <p:embeddedFont>
-      <p:font typeface="Rounded Elegance" panose="02020603050405020304" pitchFamily="18" charset="0"/>
+      <p:font typeface="Wingdings 2" panose="05020102010507070707" pitchFamily="18" charset="2"/>
       <p:regular r:id="rId22"/>
     </p:embeddedFont>
     <p:embeddedFont>
-      <p:font typeface="Esphimere Light" panose="020B0403030000020004" pitchFamily="34" charset="0"/>
+      <p:font typeface="Rounded Elegance" panose="02020603050405020304" pitchFamily="18" charset="0"/>
       <p:regular r:id="rId23"/>
     </p:embeddedFont>
     <p:embeddedFont>
-      <p:font typeface="Esphimere" panose="020B0603030000020004" pitchFamily="34" charset="0"/>
+      <p:font typeface="Arial Unicode MS" panose="020B0604020202020204" pitchFamily="34" charset="-128"/>
       <p:regular r:id="rId24"/>
-      <p:bold r:id="rId25"/>
-    </p:embeddedFont>
-    <p:embeddedFont>
-      <p:font typeface="Arial Unicode MS" panose="020B0604020202020204" pitchFamily="34" charset="-128"/>
-      <p:regular r:id="rId26"/>
     </p:embeddedFont>
     <p:embeddedFont>
       <p:font typeface="Calibri" panose="020F0502020204030204" pitchFamily="34" charset="0"/>
-      <p:regular r:id="rId27"/>
-      <p:bold r:id="rId28"/>
-      <p:italic r:id="rId29"/>
-      <p:boldItalic r:id="rId30"/>
+      <p:regular r:id="rId25"/>
+      <p:bold r:id="rId26"/>
+      <p:italic r:id="rId27"/>
+      <p:boldItalic r:id="rId28"/>
+    </p:embeddedFont>
+    <p:embeddedFont>
+      <p:font typeface="Esphimere" panose="020B0603030000020004" pitchFamily="34" charset="0"/>
+      <p:regular r:id="rId29"/>
+      <p:bold r:id="rId30"/>
     </p:embeddedFont>
   </p:embeddedFontLst>
   <p:defaultTextStyle>
@@ -249,7 +249,7 @@
           <a:p>
             <a:fld id="{ED9A2101-06F9-476E-A91B-AEDD4B962746}" type="datetimeFigureOut">
               <a:rPr lang="en-ZA" smtClean="0"/>
-              <a:t>2016/12/05</a:t>
+              <a:t>2017/10/24</a:t>
             </a:fld>
             <a:endParaRPr lang="en-ZA"/>
           </a:p>
@@ -414,7 +414,7 @@
           <a:p>
             <a:fld id="{D6CA9C55-D845-48A4-9817-F79F71CA8AF2}" type="datetimeFigureOut">
               <a:rPr lang="en-ZA" smtClean="0"/>
-              <a:t>2016/12/05</a:t>
+              <a:t>2017/10/24</a:t>
             </a:fld>
             <a:endParaRPr lang="en-ZA"/>
           </a:p>
@@ -5364,24 +5364,166 @@
           </a:p>
         </p:txBody>
       </p:sp>
-      <p:sp>
-        <p:nvSpPr>
-          <p:cNvPr id="9" name="Date Placeholder 8"/>
-          <p:cNvSpPr>
-            <a:spLocks noGrp="1"/>
-          </p:cNvSpPr>
-          <p:nvPr>
-            <p:ph type="dt" sz="half" idx="10"/>
-          </p:nvPr>
-        </p:nvSpPr>
-        <p:spPr/>
-        <p:txBody>
-          <a:bodyPr/>
-          <a:lstStyle/>
-          <a:p>
-            <a:r>
-              <a:rPr lang="en-US" dirty="0" smtClean="0"/>
-              <a:t>2016/12/07</a:t>
+      <p:pic>
+        <p:nvPicPr>
+          <p:cNvPr id="6" name="Picture 5" descr="https://orcid.org/sites/default/files/images/orcid_128x128.png"/>
+          <p:cNvPicPr>
+            <a:picLocks noChangeAspect="1" noChangeArrowheads="1"/>
+          </p:cNvPicPr>
+          <p:nvPr/>
+        </p:nvPicPr>
+        <p:blipFill>
+          <a:blip r:embed="rId3" cstate="print">
+            <a:extLst>
+              <a:ext uri="{28A0092B-C50C-407E-A947-70E740481C1C}">
+                <a14:useLocalDpi xmlns:a14="http://schemas.microsoft.com/office/drawing/2010/main" val="0"/>
+              </a:ext>
+            </a:extLst>
+          </a:blip>
+          <a:srcRect/>
+          <a:stretch>
+            <a:fillRect/>
+          </a:stretch>
+        </p:blipFill>
+        <p:spPr bwMode="auto">
+          <a:xfrm>
+            <a:off x="448329" y="6251953"/>
+            <a:ext cx="470080" cy="470080"/>
+          </a:xfrm>
+          <a:prstGeom prst="rect">
+            <a:avLst/>
+          </a:prstGeom>
+          <a:noFill/>
+          <a:extLst>
+            <a:ext uri="{909E8E84-426E-40DD-AFC4-6F175D3DCCD1}">
+              <a14:hiddenFill xmlns:a14="http://schemas.microsoft.com/office/drawing/2010/main">
+                <a:solidFill>
+                  <a:srgbClr val="FFFFFF"/>
+                </a:solidFill>
+              </a14:hiddenFill>
+            </a:ext>
+          </a:extLst>
+        </p:spPr>
+      </p:pic>
+      <p:sp>
+        <p:nvSpPr>
+          <p:cNvPr id="7" name="TextBox 5"/>
+          <p:cNvSpPr txBox="1"/>
+          <p:nvPr/>
+        </p:nvSpPr>
+        <p:spPr>
+          <a:xfrm>
+            <a:off x="948576" y="6302010"/>
+            <a:ext cx="4439264" cy="369332"/>
+          </a:xfrm>
+          <a:prstGeom prst="rect">
+            <a:avLst/>
+          </a:prstGeom>
+          <a:noFill/>
+        </p:spPr>
+        <p:txBody>
+          <a:bodyPr wrap="square" rtlCol="0">
+            <a:spAutoFit/>
+          </a:bodyPr>
+          <a:lstStyle>
+            <a:defPPr>
+              <a:defRPr lang="en-US"/>
+            </a:defPPr>
+            <a:lvl1pPr marL="0" algn="l" defTabSz="914400" rtl="0" eaLnBrk="1" latinLnBrk="0" hangingPunct="1">
+              <a:defRPr sz="1800" kern="1200">
+                <a:solidFill>
+                  <a:schemeClr val="tx1"/>
+                </a:solidFill>
+                <a:latin typeface="+mn-lt"/>
+                <a:ea typeface="+mn-ea"/>
+                <a:cs typeface="+mn-cs"/>
+              </a:defRPr>
+            </a:lvl1pPr>
+            <a:lvl2pPr marL="457200" algn="l" defTabSz="914400" rtl="0" eaLnBrk="1" latinLnBrk="0" hangingPunct="1">
+              <a:defRPr sz="1800" kern="1200">
+                <a:solidFill>
+                  <a:schemeClr val="tx1"/>
+                </a:solidFill>
+                <a:latin typeface="+mn-lt"/>
+                <a:ea typeface="+mn-ea"/>
+                <a:cs typeface="+mn-cs"/>
+              </a:defRPr>
+            </a:lvl2pPr>
+            <a:lvl3pPr marL="914400" algn="l" defTabSz="914400" rtl="0" eaLnBrk="1" latinLnBrk="0" hangingPunct="1">
+              <a:defRPr sz="1800" kern="1200">
+                <a:solidFill>
+                  <a:schemeClr val="tx1"/>
+                </a:solidFill>
+                <a:latin typeface="+mn-lt"/>
+                <a:ea typeface="+mn-ea"/>
+                <a:cs typeface="+mn-cs"/>
+              </a:defRPr>
+            </a:lvl3pPr>
+            <a:lvl4pPr marL="1371600" algn="l" defTabSz="914400" rtl="0" eaLnBrk="1" latinLnBrk="0" hangingPunct="1">
+              <a:defRPr sz="1800" kern="1200">
+                <a:solidFill>
+                  <a:schemeClr val="tx1"/>
+                </a:solidFill>
+                <a:latin typeface="+mn-lt"/>
+                <a:ea typeface="+mn-ea"/>
+                <a:cs typeface="+mn-cs"/>
+              </a:defRPr>
+            </a:lvl4pPr>
+            <a:lvl5pPr marL="1828800" algn="l" defTabSz="914400" rtl="0" eaLnBrk="1" latinLnBrk="0" hangingPunct="1">
+              <a:defRPr sz="1800" kern="1200">
+                <a:solidFill>
+                  <a:schemeClr val="tx1"/>
+                </a:solidFill>
+                <a:latin typeface="+mn-lt"/>
+                <a:ea typeface="+mn-ea"/>
+                <a:cs typeface="+mn-cs"/>
+              </a:defRPr>
+            </a:lvl5pPr>
+            <a:lvl6pPr marL="2286000" algn="l" defTabSz="914400" rtl="0" eaLnBrk="1" latinLnBrk="0" hangingPunct="1">
+              <a:defRPr sz="1800" kern="1200">
+                <a:solidFill>
+                  <a:schemeClr val="tx1"/>
+                </a:solidFill>
+                <a:latin typeface="+mn-lt"/>
+                <a:ea typeface="+mn-ea"/>
+                <a:cs typeface="+mn-cs"/>
+              </a:defRPr>
+            </a:lvl6pPr>
+            <a:lvl7pPr marL="2743200" algn="l" defTabSz="914400" rtl="0" eaLnBrk="1" latinLnBrk="0" hangingPunct="1">
+              <a:defRPr sz="1800" kern="1200">
+                <a:solidFill>
+                  <a:schemeClr val="tx1"/>
+                </a:solidFill>
+                <a:latin typeface="+mn-lt"/>
+                <a:ea typeface="+mn-ea"/>
+                <a:cs typeface="+mn-cs"/>
+              </a:defRPr>
+            </a:lvl7pPr>
+            <a:lvl8pPr marL="3200400" algn="l" defTabSz="914400" rtl="0" eaLnBrk="1" latinLnBrk="0" hangingPunct="1">
+              <a:defRPr sz="1800" kern="1200">
+                <a:solidFill>
+                  <a:schemeClr val="tx1"/>
+                </a:solidFill>
+                <a:latin typeface="+mn-lt"/>
+                <a:ea typeface="+mn-ea"/>
+                <a:cs typeface="+mn-cs"/>
+              </a:defRPr>
+            </a:lvl8pPr>
+            <a:lvl9pPr marL="3657600" algn="l" defTabSz="914400" rtl="0" eaLnBrk="1" latinLnBrk="0" hangingPunct="1">
+              <a:defRPr sz="1800" kern="1200">
+                <a:solidFill>
+                  <a:schemeClr val="tx1"/>
+                </a:solidFill>
+                <a:latin typeface="+mn-lt"/>
+                <a:ea typeface="+mn-ea"/>
+                <a:cs typeface="+mn-cs"/>
+              </a:defRPr>
+            </a:lvl9pPr>
+          </a:lstStyle>
+          <a:p>
+            <a:r>
+              <a:rPr lang="en-ZA"/>
+              <a:t>orcid.org/0000-0002-9388-8592</a:t>
             </a:r>
             <a:endParaRPr lang="en-ZA" dirty="0"/>
           </a:p>
@@ -7113,13 +7255,8 @@
           <a:p>
             <a:r>
               <a:rPr lang="en-ZA" dirty="0" smtClean="0"/>
-              <a:t>History / politics / policy / </a:t>
-            </a:r>
-            <a:r>
-              <a:rPr lang="en-ZA" dirty="0" smtClean="0"/>
-              <a:t>etc.</a:t>
-            </a:r>
-            <a:endParaRPr lang="en-ZA" dirty="0" smtClean="0"/>
+              <a:t>History / politics / policy / etc.</a:t>
+            </a:r>
           </a:p>
           <a:p>
             <a:r>

</xml_diff>